<commit_message>
Fix type in ppt
</commit_message>
<xml_diff>
--- a/teaching/zhibin/4/第四课_幻灯片.pptx
+++ b/teaching/zhibin/4/第四课_幻灯片.pptx
@@ -202,7 +202,7 @@
           <a:p>
             <a:fld id="{D2A48B96-639E-45A3-A0BA-2464DFDB1FAA}" type="datetimeFigureOut">
               <a:rPr lang="zh-CN" altLang="en-US" smtClean="0"/>
-              <a:t>2017/12/9</a:t>
+              <a:t>2017/12/15</a:t>
             </a:fld>
             <a:endParaRPr lang="zh-CN" altLang="en-US"/>
           </a:p>
@@ -596,7 +596,7 @@
           <a:p>
             <a:fld id="{82F288E0-7875-42C4-84C8-98DBBD3BF4D2}" type="datetimeFigureOut">
               <a:rPr lang="zh-CN" altLang="en-US" smtClean="0"/>
-              <a:t>2017/12/9</a:t>
+              <a:t>2017/12/15</a:t>
             </a:fld>
             <a:endParaRPr lang="zh-CN" altLang="en-US"/>
           </a:p>
@@ -743,7 +743,7 @@
           <a:p>
             <a:fld id="{82F288E0-7875-42C4-84C8-98DBBD3BF4D2}" type="datetimeFigureOut">
               <a:rPr lang="zh-CN" altLang="en-US" smtClean="0"/>
-              <a:t>2017/12/9</a:t>
+              <a:t>2017/12/15</a:t>
             </a:fld>
             <a:endParaRPr lang="zh-CN" altLang="en-US"/>
           </a:p>
@@ -908,7 +908,7 @@
           <a:p>
             <a:fld id="{82F288E0-7875-42C4-84C8-98DBBD3BF4D2}" type="datetimeFigureOut">
               <a:rPr lang="zh-CN" altLang="en-US" smtClean="0"/>
-              <a:t>2017/12/9</a:t>
+              <a:t>2017/12/15</a:t>
             </a:fld>
             <a:endParaRPr lang="zh-CN" altLang="en-US"/>
           </a:p>
@@ -1149,7 +1149,7 @@
           <a:p>
             <a:fld id="{82F288E0-7875-42C4-84C8-98DBBD3BF4D2}" type="datetimeFigureOut">
               <a:rPr lang="zh-CN" altLang="en-US" smtClean="0"/>
-              <a:t>2017/12/9</a:t>
+              <a:t>2017/12/15</a:t>
             </a:fld>
             <a:endParaRPr lang="zh-CN" altLang="en-US"/>
           </a:p>
@@ -1376,7 +1376,7 @@
           <a:p>
             <a:fld id="{82F288E0-7875-42C4-84C8-98DBBD3BF4D2}" type="datetimeFigureOut">
               <a:rPr lang="zh-CN" altLang="en-US" smtClean="0"/>
-              <a:t>2017/12/9</a:t>
+              <a:t>2017/12/15</a:t>
             </a:fld>
             <a:endParaRPr lang="zh-CN" altLang="en-US"/>
           </a:p>
@@ -1738,7 +1738,7 @@
           <a:p>
             <a:fld id="{82F288E0-7875-42C4-84C8-98DBBD3BF4D2}" type="datetimeFigureOut">
               <a:rPr lang="zh-CN" altLang="en-US" smtClean="0"/>
-              <a:t>2017/12/9</a:t>
+              <a:t>2017/12/15</a:t>
             </a:fld>
             <a:endParaRPr lang="zh-CN" altLang="en-US"/>
           </a:p>
@@ -1851,7 +1851,7 @@
           <a:p>
             <a:fld id="{82F288E0-7875-42C4-84C8-98DBBD3BF4D2}" type="datetimeFigureOut">
               <a:rPr lang="zh-CN" altLang="en-US" smtClean="0"/>
-              <a:t>2017/12/9</a:t>
+              <a:t>2017/12/15</a:t>
             </a:fld>
             <a:endParaRPr lang="zh-CN" altLang="en-US"/>
           </a:p>
@@ -1941,7 +1941,7 @@
           <a:p>
             <a:fld id="{82F288E0-7875-42C4-84C8-98DBBD3BF4D2}" type="datetimeFigureOut">
               <a:rPr lang="zh-CN" altLang="en-US" smtClean="0"/>
-              <a:t>2017/12/9</a:t>
+              <a:t>2017/12/15</a:t>
             </a:fld>
             <a:endParaRPr lang="zh-CN" altLang="en-US"/>
           </a:p>
@@ -2189,7 +2189,7 @@
           <a:p>
             <a:fld id="{82F288E0-7875-42C4-84C8-98DBBD3BF4D2}" type="datetimeFigureOut">
               <a:rPr lang="zh-CN" altLang="en-US" smtClean="0"/>
-              <a:t>2017/12/9</a:t>
+              <a:t>2017/12/15</a:t>
             </a:fld>
             <a:endParaRPr lang="zh-CN" altLang="en-US"/>
           </a:p>
@@ -2364,7 +2364,7 @@
           <a:p>
             <a:fld id="{82F288E0-7875-42C4-84C8-98DBBD3BF4D2}" type="datetimeFigureOut">
               <a:rPr lang="zh-CN" altLang="en-US" smtClean="0"/>
-              <a:t>2017/12/9</a:t>
+              <a:t>2017/12/15</a:t>
             </a:fld>
             <a:endParaRPr lang="zh-CN" altLang="en-US"/>
           </a:p>
@@ -2572,7 +2572,7 @@
           <a:p>
             <a:fld id="{82F288E0-7875-42C4-84C8-98DBBD3BF4D2}" type="datetimeFigureOut">
               <a:rPr lang="zh-CN" altLang="en-US" smtClean="0"/>
-              <a:t>2017/12/9</a:t>
+              <a:t>2017/12/15</a:t>
             </a:fld>
             <a:endParaRPr lang="zh-CN" altLang="en-US"/>
           </a:p>
@@ -3136,6 +3136,10 @@
               <a:t>lt</a:t>
             </a:r>
             <a:r>
+              <a:rPr lang="en-US" altLang="zh-CN" dirty="0" smtClean="0"/>
+              <a:t>;</a:t>
+            </a:r>
+            <a:r>
               <a:rPr lang="zh-CN" altLang="en-US" dirty="0" smtClean="0"/>
               <a:t> </a:t>
             </a:r>
@@ -3156,12 +3160,20 @@
               <a:t> 或者 </a:t>
             </a:r>
             <a:r>
-              <a:rPr lang="en-US" altLang="zh-CN" dirty="0" smtClean="0"/>
-              <a:t>&amp;#60</a:t>
+              <a:rPr lang="en-US" altLang="zh-CN" smtClean="0"/>
+              <a:t>&amp;#</a:t>
+            </a:r>
+            <a:r>
+              <a:rPr lang="en-US" altLang="zh-CN" smtClean="0"/>
+              <a:t>60;</a:t>
+            </a:r>
+            <a:r>
+              <a:rPr lang="zh-CN" altLang="en-US" smtClean="0"/>
+              <a:t> </a:t>
             </a:r>
             <a:r>
               <a:rPr lang="zh-CN" altLang="en-US" dirty="0" smtClean="0"/>
-              <a:t> 表示 </a:t>
+              <a:t>表示 </a:t>
             </a:r>
             <a:r>
               <a:rPr lang="en-US" altLang="zh-CN" dirty="0" smtClean="0"/>
@@ -3180,6 +3192,10 @@
               <a:t>gt</a:t>
             </a:r>
             <a:r>
+              <a:rPr lang="en-US" altLang="zh-CN" dirty="0" smtClean="0"/>
+              <a:t>;</a:t>
+            </a:r>
+            <a:r>
               <a:rPr lang="zh-CN" altLang="en-US" dirty="0" smtClean="0"/>
               <a:t> </a:t>
             </a:r>
@@ -3201,11 +3217,19 @@
             </a:r>
             <a:r>
               <a:rPr lang="en-US" altLang="zh-CN" dirty="0" smtClean="0"/>
-              <a:t>&amp;#62</a:t>
+              <a:t>&amp;#</a:t>
+            </a:r>
+            <a:r>
+              <a:rPr lang="en-US" altLang="zh-CN" dirty="0" smtClean="0"/>
+              <a:t>62;</a:t>
             </a:r>
             <a:r>
               <a:rPr lang="zh-CN" altLang="en-US" dirty="0" smtClean="0"/>
-              <a:t> 表示 </a:t>
+              <a:t> </a:t>
+            </a:r>
+            <a:r>
+              <a:rPr lang="zh-CN" altLang="en-US" dirty="0" smtClean="0"/>
+              <a:t>表示 </a:t>
             </a:r>
             <a:r>
               <a:rPr lang="en-US" altLang="zh-CN" dirty="0" smtClean="0"/>

</xml_diff>